<commit_message>
modif profil fonctionnel + stats
</commit_message>
<xml_diff>
--- a/Diapo présentation projet.pptx
+++ b/Diapo présentation projet.pptx
@@ -10,6 +10,7 @@
     <p:sldId id="260" r:id="rId4"/>
     <p:sldId id="258" r:id="rId5"/>
     <p:sldId id="259" r:id="rId6"/>
+    <p:sldId id="261" r:id="rId7"/>
   </p:sldIdLst>
   <p:sldSz cx="9144000" cy="6858000" type="screen4x3"/>
   <p:notesSz cx="6858000" cy="9144000"/>
@@ -292,7 +293,7 @@
           <a:p>
             <a:fld id="{17443F24-6673-4B1A-8620-59776DAB236F}" type="datetimeFigureOut">
               <a:rPr lang="fr-FR" smtClean="0"/>
-              <a:t>11/10/2022</a:t>
+              <a:t>13/10/2022</a:t>
             </a:fld>
             <a:endParaRPr lang="fr-FR"/>
           </a:p>
@@ -462,7 +463,7 @@
           <a:p>
             <a:fld id="{17443F24-6673-4B1A-8620-59776DAB236F}" type="datetimeFigureOut">
               <a:rPr lang="fr-FR" smtClean="0"/>
-              <a:t>11/10/2022</a:t>
+              <a:t>13/10/2022</a:t>
             </a:fld>
             <a:endParaRPr lang="fr-FR"/>
           </a:p>
@@ -642,7 +643,7 @@
           <a:p>
             <a:fld id="{17443F24-6673-4B1A-8620-59776DAB236F}" type="datetimeFigureOut">
               <a:rPr lang="fr-FR" smtClean="0"/>
-              <a:t>11/10/2022</a:t>
+              <a:t>13/10/2022</a:t>
             </a:fld>
             <a:endParaRPr lang="fr-FR"/>
           </a:p>
@@ -812,7 +813,7 @@
           <a:p>
             <a:fld id="{17443F24-6673-4B1A-8620-59776DAB236F}" type="datetimeFigureOut">
               <a:rPr lang="fr-FR" smtClean="0"/>
-              <a:t>11/10/2022</a:t>
+              <a:t>13/10/2022</a:t>
             </a:fld>
             <a:endParaRPr lang="fr-FR"/>
           </a:p>
@@ -1058,7 +1059,7 @@
           <a:p>
             <a:fld id="{17443F24-6673-4B1A-8620-59776DAB236F}" type="datetimeFigureOut">
               <a:rPr lang="fr-FR" smtClean="0"/>
-              <a:t>11/10/2022</a:t>
+              <a:t>13/10/2022</a:t>
             </a:fld>
             <a:endParaRPr lang="fr-FR"/>
           </a:p>
@@ -1346,7 +1347,7 @@
           <a:p>
             <a:fld id="{17443F24-6673-4B1A-8620-59776DAB236F}" type="datetimeFigureOut">
               <a:rPr lang="fr-FR" smtClean="0"/>
-              <a:t>11/10/2022</a:t>
+              <a:t>13/10/2022</a:t>
             </a:fld>
             <a:endParaRPr lang="fr-FR"/>
           </a:p>
@@ -1768,7 +1769,7 @@
           <a:p>
             <a:fld id="{17443F24-6673-4B1A-8620-59776DAB236F}" type="datetimeFigureOut">
               <a:rPr lang="fr-FR" smtClean="0"/>
-              <a:t>11/10/2022</a:t>
+              <a:t>13/10/2022</a:t>
             </a:fld>
             <a:endParaRPr lang="fr-FR"/>
           </a:p>
@@ -1886,7 +1887,7 @@
           <a:p>
             <a:fld id="{17443F24-6673-4B1A-8620-59776DAB236F}" type="datetimeFigureOut">
               <a:rPr lang="fr-FR" smtClean="0"/>
-              <a:t>11/10/2022</a:t>
+              <a:t>13/10/2022</a:t>
             </a:fld>
             <a:endParaRPr lang="fr-FR"/>
           </a:p>
@@ -1981,7 +1982,7 @@
           <a:p>
             <a:fld id="{17443F24-6673-4B1A-8620-59776DAB236F}" type="datetimeFigureOut">
               <a:rPr lang="fr-FR" smtClean="0"/>
-              <a:t>11/10/2022</a:t>
+              <a:t>13/10/2022</a:t>
             </a:fld>
             <a:endParaRPr lang="fr-FR"/>
           </a:p>
@@ -2258,7 +2259,7 @@
           <a:p>
             <a:fld id="{17443F24-6673-4B1A-8620-59776DAB236F}" type="datetimeFigureOut">
               <a:rPr lang="fr-FR" smtClean="0"/>
-              <a:t>11/10/2022</a:t>
+              <a:t>13/10/2022</a:t>
             </a:fld>
             <a:endParaRPr lang="fr-FR"/>
           </a:p>
@@ -2511,7 +2512,7 @@
           <a:p>
             <a:fld id="{17443F24-6673-4B1A-8620-59776DAB236F}" type="datetimeFigureOut">
               <a:rPr lang="fr-FR" smtClean="0"/>
-              <a:t>11/10/2022</a:t>
+              <a:t>13/10/2022</a:t>
             </a:fld>
             <a:endParaRPr lang="fr-FR"/>
           </a:p>
@@ -2724,7 +2725,7 @@
           <a:p>
             <a:fld id="{17443F24-6673-4B1A-8620-59776DAB236F}" type="datetimeFigureOut">
               <a:rPr lang="fr-FR" smtClean="0"/>
-              <a:t>11/10/2022</a:t>
+              <a:t>13/10/2022</a:t>
             </a:fld>
             <a:endParaRPr lang="fr-FR"/>
           </a:p>
@@ -5362,6 +5363,59 @@
 </p:sld>
 </file>
 
+<file path=ppt/slides/slide6.xml><?xml version="1.0" encoding="utf-8"?>
+<p:sld xmlns:a="http://schemas.openxmlformats.org/drawingml/2006/main" xmlns:r="http://schemas.openxmlformats.org/officeDocument/2006/relationships" xmlns:p="http://schemas.openxmlformats.org/presentationml/2006/main">
+  <p:cSld>
+    <p:spTree>
+      <p:nvGrpSpPr>
+        <p:cNvPr id="1" name=""/>
+        <p:cNvGrpSpPr/>
+        <p:nvPr/>
+      </p:nvGrpSpPr>
+      <p:grpSpPr>
+        <a:xfrm>
+          <a:off x="0" y="0"/>
+          <a:ext cx="0" cy="0"/>
+          <a:chOff x="0" y="0"/>
+          <a:chExt cx="0" cy="0"/>
+        </a:xfrm>
+      </p:grpSpPr>
+      <p:sp>
+        <p:nvSpPr>
+          <p:cNvPr id="2" name="Titre 1"/>
+          <p:cNvSpPr>
+            <a:spLocks noGrp="1"/>
+          </p:cNvSpPr>
+          <p:nvPr>
+            <p:ph type="title"/>
+          </p:nvPr>
+        </p:nvSpPr>
+        <p:spPr/>
+        <p:txBody>
+          <a:bodyPr/>
+          <a:lstStyle/>
+          <a:p>
+            <a:r>
+              <a:rPr lang="fr-FR" dirty="0" smtClean="0"/>
+              <a:t>Démo d’utilisation</a:t>
+            </a:r>
+            <a:endParaRPr lang="fr-FR" dirty="0"/>
+          </a:p>
+        </p:txBody>
+      </p:sp>
+    </p:spTree>
+    <p:extLst>
+      <p:ext uri="{BB962C8B-B14F-4D97-AF65-F5344CB8AC3E}">
+        <p14:creationId xmlns:p14="http://schemas.microsoft.com/office/powerpoint/2010/main" val="3824065133"/>
+      </p:ext>
+    </p:extLst>
+  </p:cSld>
+  <p:clrMapOvr>
+    <a:masterClrMapping/>
+  </p:clrMapOvr>
+</p:sld>
+</file>
+
 <file path=ppt/theme/theme1.xml><?xml version="1.0" encoding="utf-8"?>
 <a:theme xmlns:a="http://schemas.openxmlformats.org/drawingml/2006/main" name="Thème Office">
   <a:themeElements>

</xml_diff>